<commit_message>
Changed presentation slide order
</commit_message>
<xml_diff>
--- a/DesignDocument/Presentation/presentation_complete.pptx
+++ b/DesignDocument/Presentation/presentation_complete.pptx
@@ -7,15 +7,15 @@
   </p:sldMasterIdLst>
   <p:sldIdLst>
     <p:sldId id="266" r:id="rId3"/>
-    <p:sldId id="256" r:id="rId4"/>
-    <p:sldId id="258" r:id="rId5"/>
-    <p:sldId id="259" r:id="rId6"/>
-    <p:sldId id="257" r:id="rId7"/>
-    <p:sldId id="260" r:id="rId8"/>
-    <p:sldId id="261" r:id="rId9"/>
-    <p:sldId id="262" r:id="rId10"/>
-    <p:sldId id="263" r:id="rId11"/>
-    <p:sldId id="264" r:id="rId12"/>
+    <p:sldId id="260" r:id="rId4"/>
+    <p:sldId id="261" r:id="rId5"/>
+    <p:sldId id="262" r:id="rId6"/>
+    <p:sldId id="263" r:id="rId7"/>
+    <p:sldId id="264" r:id="rId8"/>
+    <p:sldId id="256" r:id="rId9"/>
+    <p:sldId id="258" r:id="rId10"/>
+    <p:sldId id="259" r:id="rId11"/>
+    <p:sldId id="257" r:id="rId12"/>
   </p:sldIdLst>
   <p:sldSz cx="12192000" cy="6858000"/>
   <p:notesSz cx="6858000" cy="9144000"/>
@@ -253,7 +253,7 @@
           <a:p>
             <a:fld id="{B4DC59CC-F5F4-41B0-A1B0-D612FED57BB5}" type="datetimeFigureOut">
               <a:rPr lang="en-US" smtClean="0"/>
-              <a:t>12/14/2016</a:t>
+              <a:t>12/15/2016</a:t>
             </a:fld>
             <a:endParaRPr lang="en-US"/>
           </a:p>
@@ -423,7 +423,7 @@
           <a:p>
             <a:fld id="{B4DC59CC-F5F4-41B0-A1B0-D612FED57BB5}" type="datetimeFigureOut">
               <a:rPr lang="en-US" smtClean="0"/>
-              <a:t>12/14/2016</a:t>
+              <a:t>12/15/2016</a:t>
             </a:fld>
             <a:endParaRPr lang="en-US"/>
           </a:p>
@@ -603,7 +603,7 @@
           <a:p>
             <a:fld id="{B4DC59CC-F5F4-41B0-A1B0-D612FED57BB5}" type="datetimeFigureOut">
               <a:rPr lang="en-US" smtClean="0"/>
-              <a:t>12/14/2016</a:t>
+              <a:t>12/15/2016</a:t>
             </a:fld>
             <a:endParaRPr lang="en-US"/>
           </a:p>
@@ -837,7 +837,7 @@
                 <a:tabLst/>
                 <a:defRPr/>
               </a:pPr>
-              <a:t>14/12/2016</a:t>
+              <a:t>15/12/2016</a:t>
             </a:fld>
             <a:endParaRPr kumimoji="0" lang="it-IT" sz="1800" b="0" i="0" u="none" strike="noStrike" kern="0" cap="none" spc="0" normalizeH="0" baseline="0" noProof="0">
               <a:ln>
@@ -1140,7 +1140,7 @@
                 <a:tabLst/>
                 <a:defRPr/>
               </a:pPr>
-              <a:t>14/12/2016</a:t>
+              <a:t>15/12/2016</a:t>
             </a:fld>
             <a:endParaRPr kumimoji="0" lang="it-IT" sz="1800" b="0" i="0" u="none" strike="noStrike" kern="0" cap="none" spc="0" normalizeH="0" baseline="0" noProof="0">
               <a:ln>
@@ -1401,7 +1401,7 @@
           <a:p>
             <a:fld id="{B4DC59CC-F5F4-41B0-A1B0-D612FED57BB5}" type="datetimeFigureOut">
               <a:rPr lang="en-US" smtClean="0"/>
-              <a:t>12/14/2016</a:t>
+              <a:t>12/15/2016</a:t>
             </a:fld>
             <a:endParaRPr lang="en-US"/>
           </a:p>
@@ -1647,7 +1647,7 @@
           <a:p>
             <a:fld id="{B4DC59CC-F5F4-41B0-A1B0-D612FED57BB5}" type="datetimeFigureOut">
               <a:rPr lang="en-US" smtClean="0"/>
-              <a:t>12/14/2016</a:t>
+              <a:t>12/15/2016</a:t>
             </a:fld>
             <a:endParaRPr lang="en-US"/>
           </a:p>
@@ -1879,7 +1879,7 @@
           <a:p>
             <a:fld id="{B4DC59CC-F5F4-41B0-A1B0-D612FED57BB5}" type="datetimeFigureOut">
               <a:rPr lang="en-US" smtClean="0"/>
-              <a:t>12/14/2016</a:t>
+              <a:t>12/15/2016</a:t>
             </a:fld>
             <a:endParaRPr lang="en-US"/>
           </a:p>
@@ -2246,7 +2246,7 @@
           <a:p>
             <a:fld id="{B4DC59CC-F5F4-41B0-A1B0-D612FED57BB5}" type="datetimeFigureOut">
               <a:rPr lang="en-US" smtClean="0"/>
-              <a:t>12/14/2016</a:t>
+              <a:t>12/15/2016</a:t>
             </a:fld>
             <a:endParaRPr lang="en-US"/>
           </a:p>
@@ -2364,7 +2364,7 @@
           <a:p>
             <a:fld id="{B4DC59CC-F5F4-41B0-A1B0-D612FED57BB5}" type="datetimeFigureOut">
               <a:rPr lang="en-US" smtClean="0"/>
-              <a:t>12/14/2016</a:t>
+              <a:t>12/15/2016</a:t>
             </a:fld>
             <a:endParaRPr lang="en-US"/>
           </a:p>
@@ -2459,7 +2459,7 @@
           <a:p>
             <a:fld id="{B4DC59CC-F5F4-41B0-A1B0-D612FED57BB5}" type="datetimeFigureOut">
               <a:rPr lang="en-US" smtClean="0"/>
-              <a:t>12/14/2016</a:t>
+              <a:t>12/15/2016</a:t>
             </a:fld>
             <a:endParaRPr lang="en-US"/>
           </a:p>
@@ -2736,7 +2736,7 @@
           <a:p>
             <a:fld id="{B4DC59CC-F5F4-41B0-A1B0-D612FED57BB5}" type="datetimeFigureOut">
               <a:rPr lang="en-US" smtClean="0"/>
-              <a:t>12/14/2016</a:t>
+              <a:t>12/15/2016</a:t>
             </a:fld>
             <a:endParaRPr lang="en-US"/>
           </a:p>
@@ -2989,7 +2989,7 @@
           <a:p>
             <a:fld id="{B4DC59CC-F5F4-41B0-A1B0-D612FED57BB5}" type="datetimeFigureOut">
               <a:rPr lang="en-US" smtClean="0"/>
-              <a:t>12/14/2016</a:t>
+              <a:t>12/15/2016</a:t>
             </a:fld>
             <a:endParaRPr lang="en-US"/>
           </a:p>
@@ -3207,7 +3207,7 @@
           <a:p>
             <a:fld id="{B4DC59CC-F5F4-41B0-A1B0-D612FED57BB5}" type="datetimeFigureOut">
               <a:rPr lang="en-US" smtClean="0"/>
-              <a:t>12/14/2016</a:t>
+              <a:t>12/15/2016</a:t>
             </a:fld>
             <a:endParaRPr lang="en-US"/>
           </a:p>
@@ -3750,7 +3750,7 @@
           <a:p>
             <a:fld id="{2832B5F3-C62E-4BC1-B17E-2C18234E388F}" type="datetimeFigureOut">
               <a:rPr lang="it-IT" smtClean="0"/>
-              <a:t>14/12/2016</a:t>
+              <a:t>15/12/2016</a:t>
             </a:fld>
             <a:endParaRPr lang="it-IT"/>
           </a:p>
@@ -4168,6 +4168,38 @@
           </a:p>
         </p:txBody>
       </p:sp>
+      <p:sp>
+        <p:nvSpPr>
+          <p:cNvPr id="3" name="Sottotitolo 2"/>
+          <p:cNvSpPr>
+            <a:spLocks noGrp="1"/>
+          </p:cNvSpPr>
+          <p:nvPr>
+            <p:ph type="subTitle" idx="1"/>
+          </p:nvPr>
+        </p:nvSpPr>
+        <p:spPr/>
+        <p:txBody>
+          <a:bodyPr>
+            <a:normAutofit/>
+          </a:bodyPr>
+          <a:lstStyle/>
+          <a:p>
+            <a:r>
+              <a:rPr lang="it-IT" sz="3200" dirty="0"/>
+              <a:t>Boriero Stefano	</a:t>
+            </a:r>
+            <a:r>
+              <a:rPr lang="it-IT" sz="3200" dirty="0" err="1"/>
+              <a:t>Brunitti</a:t>
+            </a:r>
+            <a:r>
+              <a:rPr lang="it-IT" sz="3200" dirty="0"/>
+              <a:t> Simone</a:t>
+            </a:r>
+          </a:p>
+        </p:txBody>
+      </p:sp>
     </p:spTree>
     <p:extLst>
       <p:ext uri="{BB962C8B-B14F-4D97-AF65-F5344CB8AC3E}">
@@ -4182,6 +4214,762 @@
 </file>
 
 <file path=ppt/slides/slide10.xml><?xml version="1.0" encoding="utf-8"?>
+<p:sld xmlns:a="http://schemas.openxmlformats.org/drawingml/2006/main" xmlns:r="http://schemas.openxmlformats.org/officeDocument/2006/relationships" xmlns:p="http://schemas.openxmlformats.org/presentationml/2006/main">
+  <p:cSld>
+    <p:spTree>
+      <p:nvGrpSpPr>
+        <p:cNvPr id="1" name=""/>
+        <p:cNvGrpSpPr/>
+        <p:nvPr/>
+      </p:nvGrpSpPr>
+      <p:grpSpPr>
+        <a:xfrm>
+          <a:off x="0" y="0"/>
+          <a:ext cx="0" cy="0"/>
+          <a:chOff x="0" y="0"/>
+          <a:chExt cx="0" cy="0"/>
+        </a:xfrm>
+      </p:grpSpPr>
+      <p:sp>
+        <p:nvSpPr>
+          <p:cNvPr id="2" name="Titolo 1"/>
+          <p:cNvSpPr>
+            <a:spLocks noGrp="1"/>
+          </p:cNvSpPr>
+          <p:nvPr>
+            <p:ph type="title"/>
+          </p:nvPr>
+        </p:nvSpPr>
+        <p:spPr/>
+        <p:txBody>
+          <a:bodyPr/>
+          <a:lstStyle/>
+          <a:p>
+            <a:pPr algn="ctr"/>
+            <a:r>
+              <a:rPr lang="en-US" dirty="0"/>
+              <a:t>Component Based</a:t>
+            </a:r>
+          </a:p>
+        </p:txBody>
+      </p:sp>
+      <p:sp>
+        <p:nvSpPr>
+          <p:cNvPr id="3" name="Segnaposto contenuto 2"/>
+          <p:cNvSpPr>
+            <a:spLocks noGrp="1"/>
+          </p:cNvSpPr>
+          <p:nvPr>
+            <p:ph idx="1"/>
+          </p:nvPr>
+        </p:nvSpPr>
+        <p:spPr/>
+        <p:txBody>
+          <a:bodyPr/>
+          <a:lstStyle/>
+          <a:p>
+            <a:r>
+              <a:rPr lang="en-US" b="1" dirty="0"/>
+              <a:t>Component-based </a:t>
+            </a:r>
+            <a:r>
+              <a:rPr lang="en-US" dirty="0"/>
+              <a:t>advantages</a:t>
+            </a:r>
+            <a:r>
+              <a:rPr lang="en-US" b="1" dirty="0"/>
+              <a:t> : </a:t>
+            </a:r>
+            <a:endParaRPr lang="en-US" dirty="0"/>
+          </a:p>
+          <a:p>
+            <a:pPr lvl="1"/>
+            <a:r>
+              <a:rPr lang="en-US" dirty="0"/>
+              <a:t>Divide workloads </a:t>
+            </a:r>
+          </a:p>
+          <a:p>
+            <a:pPr lvl="1"/>
+            <a:r>
+              <a:rPr lang="en-US" dirty="0"/>
+              <a:t>Easily scalable</a:t>
+            </a:r>
+          </a:p>
+          <a:p>
+            <a:pPr marL="457200" lvl="1" indent="0">
+              <a:buNone/>
+            </a:pPr>
+            <a:endParaRPr lang="en-US" dirty="0"/>
+          </a:p>
+        </p:txBody>
+      </p:sp>
+      <p:sp>
+        <p:nvSpPr>
+          <p:cNvPr id="4" name="CasellaDiTesto 3"/>
+          <p:cNvSpPr txBox="1"/>
+          <p:nvPr/>
+        </p:nvSpPr>
+        <p:spPr>
+          <a:xfrm>
+            <a:off x="847344" y="3300984"/>
+            <a:ext cx="7168896" cy="523220"/>
+          </a:xfrm>
+          <a:prstGeom prst="rect">
+            <a:avLst/>
+          </a:prstGeom>
+          <a:noFill/>
+        </p:spPr>
+        <p:txBody>
+          <a:bodyPr wrap="square" rtlCol="0">
+            <a:spAutoFit/>
+          </a:bodyPr>
+          <a:lstStyle/>
+          <a:p>
+            <a:pPr marL="285750" indent="-285750">
+              <a:buFont typeface="Arial" panose="020B0604020202020204" pitchFamily="34" charset="0"/>
+              <a:buChar char="•"/>
+            </a:pPr>
+            <a:endParaRPr lang="en-US" sz="2800" b="1" dirty="0"/>
+          </a:p>
+        </p:txBody>
+      </p:sp>
+    </p:spTree>
+    <p:extLst>
+      <p:ext uri="{BB962C8B-B14F-4D97-AF65-F5344CB8AC3E}">
+        <p14:creationId xmlns:p14="http://schemas.microsoft.com/office/powerpoint/2010/main" val="3520994693"/>
+      </p:ext>
+    </p:extLst>
+  </p:cSld>
+  <p:clrMapOvr>
+    <a:masterClrMapping/>
+  </p:clrMapOvr>
+</p:sld>
+</file>
+
+<file path=ppt/slides/slide2.xml><?xml version="1.0" encoding="utf-8"?>
+<p:sld xmlns:a="http://schemas.openxmlformats.org/drawingml/2006/main" xmlns:r="http://schemas.openxmlformats.org/officeDocument/2006/relationships" xmlns:p="http://schemas.openxmlformats.org/presentationml/2006/main">
+  <p:cSld>
+    <p:spTree>
+      <p:nvGrpSpPr>
+        <p:cNvPr id="1" name=""/>
+        <p:cNvGrpSpPr/>
+        <p:nvPr/>
+      </p:nvGrpSpPr>
+      <p:grpSpPr>
+        <a:xfrm>
+          <a:off x="0" y="0"/>
+          <a:ext cx="0" cy="0"/>
+          <a:chOff x="0" y="0"/>
+          <a:chExt cx="0" cy="0"/>
+        </a:xfrm>
+      </p:grpSpPr>
+      <p:sp>
+        <p:nvSpPr>
+          <p:cNvPr id="2" name="Titolo 1"/>
+          <p:cNvSpPr>
+            <a:spLocks noGrp="1"/>
+          </p:cNvSpPr>
+          <p:nvPr>
+            <p:ph type="ctrTitle"/>
+          </p:nvPr>
+        </p:nvSpPr>
+        <p:spPr/>
+        <p:txBody>
+          <a:bodyPr/>
+          <a:lstStyle/>
+          <a:p>
+            <a:r>
+              <a:rPr lang="it-IT" dirty="0"/>
+              <a:t>OVERVIEW</a:t>
+            </a:r>
+          </a:p>
+        </p:txBody>
+      </p:sp>
+    </p:spTree>
+    <p:extLst>
+      <p:ext uri="{BB962C8B-B14F-4D97-AF65-F5344CB8AC3E}">
+        <p14:creationId xmlns:p14="http://schemas.microsoft.com/office/powerpoint/2010/main" val="1641834448"/>
+      </p:ext>
+    </p:extLst>
+  </p:cSld>
+  <p:clrMapOvr>
+    <a:masterClrMapping/>
+  </p:clrMapOvr>
+</p:sld>
+</file>
+
+<file path=ppt/slides/slide3.xml><?xml version="1.0" encoding="utf-8"?>
+<p:sld xmlns:a="http://schemas.openxmlformats.org/drawingml/2006/main" xmlns:r="http://schemas.openxmlformats.org/officeDocument/2006/relationships" xmlns:p="http://schemas.openxmlformats.org/presentationml/2006/main">
+  <p:cSld>
+    <p:spTree>
+      <p:nvGrpSpPr>
+        <p:cNvPr id="1" name=""/>
+        <p:cNvGrpSpPr/>
+        <p:nvPr/>
+      </p:nvGrpSpPr>
+      <p:grpSpPr>
+        <a:xfrm>
+          <a:off x="0" y="0"/>
+          <a:ext cx="0" cy="0"/>
+          <a:chOff x="0" y="0"/>
+          <a:chExt cx="0" cy="0"/>
+        </a:xfrm>
+      </p:grpSpPr>
+      <p:pic>
+        <p:nvPicPr>
+          <p:cNvPr id="9" name="Immagine 8"/>
+          <p:cNvPicPr>
+            <a:picLocks noChangeAspect="1"/>
+          </p:cNvPicPr>
+          <p:nvPr/>
+        </p:nvPicPr>
+        <p:blipFill>
+          <a:blip r:embed="rId2">
+            <a:extLst>
+              <a:ext uri="{28A0092B-C50C-407E-A947-70E740481C1C}">
+                <a14:useLocalDpi xmlns:a14="http://schemas.microsoft.com/office/drawing/2010/main" val="0"/>
+              </a:ext>
+            </a:extLst>
+          </a:blip>
+          <a:stretch>
+            <a:fillRect/>
+          </a:stretch>
+        </p:blipFill>
+        <p:spPr>
+          <a:xfrm>
+            <a:off x="348615" y="569008"/>
+            <a:ext cx="8668775" cy="5879893"/>
+          </a:xfrm>
+          <a:prstGeom prst="rect">
+            <a:avLst/>
+          </a:prstGeom>
+        </p:spPr>
+      </p:pic>
+      <p:sp>
+        <p:nvSpPr>
+          <p:cNvPr id="10" name="CasellaDiTesto 9"/>
+          <p:cNvSpPr txBox="1"/>
+          <p:nvPr/>
+        </p:nvSpPr>
+        <p:spPr>
+          <a:xfrm>
+            <a:off x="9214338" y="534572"/>
+            <a:ext cx="2799471" cy="2554545"/>
+          </a:xfrm>
+          <a:prstGeom prst="rect">
+            <a:avLst/>
+          </a:prstGeom>
+          <a:noFill/>
+        </p:spPr>
+        <p:txBody>
+          <a:bodyPr wrap="square" rtlCol="0">
+            <a:spAutoFit/>
+          </a:bodyPr>
+          <a:lstStyle/>
+          <a:p>
+            <a:pPr marL="0" marR="0" lvl="0" indent="0" defTabSz="914400" eaLnBrk="1" fontAlgn="auto" latinLnBrk="0" hangingPunct="1">
+              <a:lnSpc>
+                <a:spcPct val="100000"/>
+              </a:lnSpc>
+              <a:spcBef>
+                <a:spcPts val="0"/>
+              </a:spcBef>
+              <a:spcAft>
+                <a:spcPts val="0"/>
+              </a:spcAft>
+              <a:buClrTx/>
+              <a:buSzTx/>
+              <a:buFontTx/>
+              <a:buNone/>
+              <a:tabLst/>
+              <a:defRPr/>
+            </a:pPr>
+            <a:r>
+              <a:rPr kumimoji="0" lang="it-IT" sz="3200" b="0" i="0" u="none" strike="noStrike" kern="0" cap="none" spc="0" normalizeH="0" baseline="0" noProof="0" dirty="0">
+                <a:ln>
+                  <a:noFill/>
+                </a:ln>
+                <a:solidFill>
+                  <a:sysClr val="windowText" lastClr="000000"/>
+                </a:solidFill>
+                <a:effectLst/>
+                <a:uLnTx/>
+                <a:uFillTx/>
+              </a:rPr>
+              <a:t>LEGEND:</a:t>
+            </a:r>
+          </a:p>
+          <a:p>
+            <a:pPr marL="285750" marR="0" lvl="0" indent="-285750" defTabSz="914400" eaLnBrk="1" fontAlgn="auto" latinLnBrk="0" hangingPunct="1">
+              <a:lnSpc>
+                <a:spcPct val="100000"/>
+              </a:lnSpc>
+              <a:spcBef>
+                <a:spcPts val="0"/>
+              </a:spcBef>
+              <a:spcAft>
+                <a:spcPts val="0"/>
+              </a:spcAft>
+              <a:buClrTx/>
+              <a:buSzTx/>
+              <a:buFontTx/>
+              <a:buChar char="-"/>
+              <a:tabLst/>
+              <a:defRPr/>
+            </a:pPr>
+            <a:r>
+              <a:rPr kumimoji="0" lang="it-IT" sz="3200" b="0" i="0" u="none" strike="noStrike" kern="0" cap="none" spc="0" normalizeH="0" baseline="0" noProof="0" dirty="0">
+                <a:ln>
+                  <a:noFill/>
+                </a:ln>
+                <a:solidFill>
+                  <a:srgbClr val="FF0000"/>
+                </a:solidFill>
+                <a:effectLst/>
+                <a:uLnTx/>
+                <a:uFillTx/>
+              </a:rPr>
+              <a:t>Presentation </a:t>
+            </a:r>
+            <a:r>
+              <a:rPr kumimoji="0" lang="it-IT" sz="3200" b="0" i="0" u="none" strike="noStrike" kern="0" cap="none" spc="0" normalizeH="0" baseline="0" noProof="0" dirty="0" err="1">
+                <a:ln>
+                  <a:noFill/>
+                </a:ln>
+                <a:solidFill>
+                  <a:srgbClr val="FF0000"/>
+                </a:solidFill>
+                <a:effectLst/>
+                <a:uLnTx/>
+                <a:uFillTx/>
+              </a:rPr>
+              <a:t>Tier</a:t>
+            </a:r>
+            <a:endParaRPr kumimoji="0" lang="it-IT" sz="3200" b="0" i="0" u="none" strike="noStrike" kern="0" cap="none" spc="0" normalizeH="0" baseline="0" noProof="0" dirty="0">
+              <a:ln>
+                <a:noFill/>
+              </a:ln>
+              <a:solidFill>
+                <a:srgbClr val="FF0000"/>
+              </a:solidFill>
+              <a:effectLst/>
+              <a:uLnTx/>
+              <a:uFillTx/>
+            </a:endParaRPr>
+          </a:p>
+          <a:p>
+            <a:pPr marL="285750" marR="0" lvl="0" indent="-285750" defTabSz="914400" eaLnBrk="1" fontAlgn="auto" latinLnBrk="0" hangingPunct="1">
+              <a:lnSpc>
+                <a:spcPct val="100000"/>
+              </a:lnSpc>
+              <a:spcBef>
+                <a:spcPts val="0"/>
+              </a:spcBef>
+              <a:spcAft>
+                <a:spcPts val="0"/>
+              </a:spcAft>
+              <a:buClrTx/>
+              <a:buSzTx/>
+              <a:buFontTx/>
+              <a:buChar char="-"/>
+              <a:tabLst/>
+              <a:defRPr/>
+            </a:pPr>
+            <a:r>
+              <a:rPr kumimoji="0" lang="it-IT" sz="3200" b="0" i="0" u="none" strike="noStrike" kern="0" cap="none" spc="0" normalizeH="0" baseline="0" noProof="0" dirty="0">
+                <a:ln>
+                  <a:noFill/>
+                </a:ln>
+                <a:solidFill>
+                  <a:srgbClr val="00B050"/>
+                </a:solidFill>
+                <a:effectLst/>
+                <a:uLnTx/>
+                <a:uFillTx/>
+              </a:rPr>
+              <a:t>Business </a:t>
+            </a:r>
+            <a:r>
+              <a:rPr kumimoji="0" lang="it-IT" sz="3200" b="0" i="0" u="none" strike="noStrike" kern="0" cap="none" spc="0" normalizeH="0" baseline="0" noProof="0" dirty="0" err="1">
+                <a:ln>
+                  <a:noFill/>
+                </a:ln>
+                <a:solidFill>
+                  <a:srgbClr val="00B050"/>
+                </a:solidFill>
+                <a:effectLst/>
+                <a:uLnTx/>
+                <a:uFillTx/>
+              </a:rPr>
+              <a:t>Tier</a:t>
+            </a:r>
+            <a:endParaRPr kumimoji="0" lang="it-IT" sz="3200" b="0" i="0" u="none" strike="noStrike" kern="0" cap="none" spc="0" normalizeH="0" baseline="0" noProof="0" dirty="0">
+              <a:ln>
+                <a:noFill/>
+              </a:ln>
+              <a:solidFill>
+                <a:srgbClr val="00B050"/>
+              </a:solidFill>
+              <a:effectLst/>
+              <a:uLnTx/>
+              <a:uFillTx/>
+            </a:endParaRPr>
+          </a:p>
+          <a:p>
+            <a:pPr marL="285750" marR="0" lvl="0" indent="-285750" defTabSz="914400" eaLnBrk="1" fontAlgn="auto" latinLnBrk="0" hangingPunct="1">
+              <a:lnSpc>
+                <a:spcPct val="100000"/>
+              </a:lnSpc>
+              <a:spcBef>
+                <a:spcPts val="0"/>
+              </a:spcBef>
+              <a:spcAft>
+                <a:spcPts val="0"/>
+              </a:spcAft>
+              <a:buClrTx/>
+              <a:buSzTx/>
+              <a:buFontTx/>
+              <a:buChar char="-"/>
+              <a:tabLst/>
+              <a:defRPr/>
+            </a:pPr>
+            <a:r>
+              <a:rPr kumimoji="0" lang="it-IT" sz="3200" b="0" i="0" u="none" strike="noStrike" kern="0" cap="none" spc="0" normalizeH="0" baseline="0" noProof="0" dirty="0">
+                <a:ln>
+                  <a:noFill/>
+                </a:ln>
+                <a:solidFill>
+                  <a:srgbClr val="0070C0"/>
+                </a:solidFill>
+                <a:effectLst/>
+                <a:uLnTx/>
+                <a:uFillTx/>
+              </a:rPr>
+              <a:t>Data </a:t>
+            </a:r>
+            <a:r>
+              <a:rPr kumimoji="0" lang="it-IT" sz="3200" b="0" i="0" u="none" strike="noStrike" kern="0" cap="none" spc="0" normalizeH="0" baseline="0" noProof="0" dirty="0" err="1">
+                <a:ln>
+                  <a:noFill/>
+                </a:ln>
+                <a:solidFill>
+                  <a:srgbClr val="0070C0"/>
+                </a:solidFill>
+                <a:effectLst/>
+                <a:uLnTx/>
+                <a:uFillTx/>
+              </a:rPr>
+              <a:t>Tier</a:t>
+            </a:r>
+            <a:endParaRPr kumimoji="0" lang="it-IT" sz="3200" b="0" i="0" u="none" strike="noStrike" kern="0" cap="none" spc="0" normalizeH="0" baseline="0" noProof="0" dirty="0">
+              <a:ln>
+                <a:noFill/>
+              </a:ln>
+              <a:solidFill>
+                <a:srgbClr val="0070C0"/>
+              </a:solidFill>
+              <a:effectLst/>
+              <a:uLnTx/>
+              <a:uFillTx/>
+            </a:endParaRPr>
+          </a:p>
+        </p:txBody>
+      </p:sp>
+    </p:spTree>
+    <p:extLst>
+      <p:ext uri="{BB962C8B-B14F-4D97-AF65-F5344CB8AC3E}">
+        <p14:creationId xmlns:p14="http://schemas.microsoft.com/office/powerpoint/2010/main" val="3688357543"/>
+      </p:ext>
+    </p:extLst>
+  </p:cSld>
+  <p:clrMapOvr>
+    <a:masterClrMapping/>
+  </p:clrMapOvr>
+</p:sld>
+</file>
+
+<file path=ppt/slides/slide4.xml><?xml version="1.0" encoding="utf-8"?>
+<p:sld xmlns:a="http://schemas.openxmlformats.org/drawingml/2006/main" xmlns:r="http://schemas.openxmlformats.org/officeDocument/2006/relationships" xmlns:p="http://schemas.openxmlformats.org/presentationml/2006/main">
+  <p:cSld>
+    <p:spTree>
+      <p:nvGrpSpPr>
+        <p:cNvPr id="1" name=""/>
+        <p:cNvGrpSpPr/>
+        <p:nvPr/>
+      </p:nvGrpSpPr>
+      <p:grpSpPr>
+        <a:xfrm>
+          <a:off x="0" y="0"/>
+          <a:ext cx="0" cy="0"/>
+          <a:chOff x="0" y="0"/>
+          <a:chExt cx="0" cy="0"/>
+        </a:xfrm>
+      </p:grpSpPr>
+      <p:sp>
+        <p:nvSpPr>
+          <p:cNvPr id="2" name="Titolo 1"/>
+          <p:cNvSpPr>
+            <a:spLocks noGrp="1"/>
+          </p:cNvSpPr>
+          <p:nvPr>
+            <p:ph type="title"/>
+          </p:nvPr>
+        </p:nvSpPr>
+        <p:spPr/>
+        <p:txBody>
+          <a:bodyPr/>
+          <a:lstStyle/>
+          <a:p>
+            <a:r>
+              <a:rPr lang="it-IT" dirty="0"/>
+              <a:t>Business </a:t>
+            </a:r>
+            <a:r>
+              <a:rPr lang="it-IT" dirty="0" err="1"/>
+              <a:t>Logic</a:t>
+            </a:r>
+            <a:r>
+              <a:rPr lang="it-IT" dirty="0"/>
+              <a:t> </a:t>
+            </a:r>
+            <a:r>
+              <a:rPr lang="it-IT" dirty="0" err="1"/>
+              <a:t>Partition</a:t>
+            </a:r>
+            <a:endParaRPr lang="it-IT" dirty="0"/>
+          </a:p>
+        </p:txBody>
+      </p:sp>
+      <p:sp>
+        <p:nvSpPr>
+          <p:cNvPr id="3" name="Segnaposto contenuto 2"/>
+          <p:cNvSpPr>
+            <a:spLocks noGrp="1"/>
+          </p:cNvSpPr>
+          <p:nvPr>
+            <p:ph idx="1"/>
+          </p:nvPr>
+        </p:nvSpPr>
+        <p:spPr/>
+        <p:txBody>
+          <a:bodyPr numCol="2" spcCol="1116000"/>
+          <a:lstStyle/>
+          <a:p>
+            <a:pPr marL="0" indent="0">
+              <a:buNone/>
+            </a:pPr>
+            <a:r>
+              <a:rPr lang="it-IT" sz="3200" b="1" dirty="0"/>
+              <a:t>API Server</a:t>
+            </a:r>
+          </a:p>
+          <a:p>
+            <a:pPr>
+              <a:buFontTx/>
+              <a:buChar char="-"/>
+            </a:pPr>
+            <a:r>
+              <a:rPr lang="it-IT" dirty="0"/>
+              <a:t>Account Management</a:t>
+            </a:r>
+          </a:p>
+          <a:p>
+            <a:pPr>
+              <a:buFontTx/>
+              <a:buChar char="-"/>
+            </a:pPr>
+            <a:r>
+              <a:rPr lang="it-IT" dirty="0" err="1"/>
+              <a:t>Reservation</a:t>
+            </a:r>
+            <a:r>
+              <a:rPr lang="it-IT" dirty="0"/>
+              <a:t> Management</a:t>
+            </a:r>
+          </a:p>
+          <a:p>
+            <a:pPr>
+              <a:buFontTx/>
+              <a:buChar char="-"/>
+            </a:pPr>
+            <a:r>
+              <a:rPr lang="it-IT" dirty="0" err="1"/>
+              <a:t>Fleet</a:t>
+            </a:r>
+            <a:r>
+              <a:rPr lang="it-IT" dirty="0"/>
+              <a:t> Management</a:t>
+            </a:r>
+          </a:p>
+          <a:p>
+            <a:pPr>
+              <a:buFontTx/>
+              <a:buChar char="-"/>
+            </a:pPr>
+            <a:endParaRPr lang="it-IT" dirty="0"/>
+          </a:p>
+          <a:p>
+            <a:pPr>
+              <a:buFontTx/>
+              <a:buChar char="-"/>
+            </a:pPr>
+            <a:endParaRPr lang="it-IT" dirty="0"/>
+          </a:p>
+          <a:p>
+            <a:pPr>
+              <a:buFontTx/>
+              <a:buChar char="-"/>
+            </a:pPr>
+            <a:endParaRPr lang="it-IT" dirty="0"/>
+          </a:p>
+          <a:p>
+            <a:pPr>
+              <a:buFontTx/>
+              <a:buChar char="-"/>
+            </a:pPr>
+            <a:endParaRPr lang="it-IT" dirty="0"/>
+          </a:p>
+          <a:p>
+            <a:pPr marL="0" indent="0">
+              <a:buNone/>
+            </a:pPr>
+            <a:r>
+              <a:rPr lang="it-IT" sz="3200" b="1" dirty="0" err="1"/>
+              <a:t>CarApplication</a:t>
+            </a:r>
+            <a:endParaRPr lang="it-IT" sz="3200" b="1" dirty="0"/>
+          </a:p>
+          <a:p>
+            <a:pPr>
+              <a:buFontTx/>
+              <a:buChar char="-"/>
+            </a:pPr>
+            <a:r>
+              <a:rPr lang="it-IT" dirty="0"/>
+              <a:t>Data Collection and Analysis</a:t>
+            </a:r>
+          </a:p>
+          <a:p>
+            <a:pPr>
+              <a:buFontTx/>
+              <a:buChar char="-"/>
+            </a:pPr>
+            <a:r>
+              <a:rPr lang="it-IT" dirty="0"/>
+              <a:t>Ride </a:t>
+            </a:r>
+            <a:r>
+              <a:rPr lang="it-IT" dirty="0" err="1"/>
+              <a:t>Monitoring</a:t>
+            </a:r>
+            <a:endParaRPr lang="it-IT" dirty="0"/>
+          </a:p>
+          <a:p>
+            <a:pPr>
+              <a:buFontTx/>
+              <a:buChar char="-"/>
+            </a:pPr>
+            <a:r>
+              <a:rPr lang="it-IT" dirty="0" err="1"/>
+              <a:t>Rule</a:t>
+            </a:r>
+            <a:r>
+              <a:rPr lang="it-IT" dirty="0"/>
+              <a:t> </a:t>
+            </a:r>
+            <a:r>
+              <a:rPr lang="it-IT" dirty="0" err="1"/>
+              <a:t>Infraction</a:t>
+            </a:r>
+            <a:r>
+              <a:rPr lang="it-IT" dirty="0"/>
+              <a:t> </a:t>
+            </a:r>
+            <a:r>
+              <a:rPr lang="it-IT" dirty="0" err="1"/>
+              <a:t>Detection</a:t>
+            </a:r>
+            <a:r>
+              <a:rPr lang="it-IT" dirty="0"/>
+              <a:t> and Notification</a:t>
+            </a:r>
+          </a:p>
+        </p:txBody>
+      </p:sp>
+    </p:spTree>
+    <p:extLst>
+      <p:ext uri="{BB962C8B-B14F-4D97-AF65-F5344CB8AC3E}">
+        <p14:creationId xmlns:p14="http://schemas.microsoft.com/office/powerpoint/2010/main" val="1444003728"/>
+      </p:ext>
+    </p:extLst>
+  </p:cSld>
+  <p:clrMapOvr>
+    <a:masterClrMapping/>
+  </p:clrMapOvr>
+</p:sld>
+</file>
+
+<file path=ppt/slides/slide5.xml><?xml version="1.0" encoding="utf-8"?>
+<p:sld xmlns:a="http://schemas.openxmlformats.org/drawingml/2006/main" xmlns:r="http://schemas.openxmlformats.org/officeDocument/2006/relationships" xmlns:p="http://schemas.openxmlformats.org/presentationml/2006/main">
+  <p:cSld>
+    <p:spTree>
+      <p:nvGrpSpPr>
+        <p:cNvPr id="1" name=""/>
+        <p:cNvGrpSpPr/>
+        <p:nvPr/>
+      </p:nvGrpSpPr>
+      <p:grpSpPr>
+        <a:xfrm>
+          <a:off x="0" y="0"/>
+          <a:ext cx="0" cy="0"/>
+          <a:chOff x="0" y="0"/>
+          <a:chExt cx="0" cy="0"/>
+        </a:xfrm>
+      </p:grpSpPr>
+      <p:sp>
+        <p:nvSpPr>
+          <p:cNvPr id="2" name="Titolo 1"/>
+          <p:cNvSpPr>
+            <a:spLocks noGrp="1"/>
+          </p:cNvSpPr>
+          <p:nvPr>
+            <p:ph type="ctrTitle"/>
+          </p:nvPr>
+        </p:nvSpPr>
+        <p:spPr/>
+        <p:txBody>
+          <a:bodyPr/>
+          <a:lstStyle/>
+          <a:p>
+            <a:r>
+              <a:rPr lang="it-IT" dirty="0"/>
+              <a:t>DEPLOYMENT</a:t>
+            </a:r>
+            <a:br>
+              <a:rPr lang="it-IT" dirty="0"/>
+            </a:br>
+            <a:r>
+              <a:rPr lang="it-IT" dirty="0"/>
+              <a:t>VIEW</a:t>
+            </a:r>
+          </a:p>
+        </p:txBody>
+      </p:sp>
+    </p:spTree>
+    <p:extLst>
+      <p:ext uri="{BB962C8B-B14F-4D97-AF65-F5344CB8AC3E}">
+        <p14:creationId xmlns:p14="http://schemas.microsoft.com/office/powerpoint/2010/main" val="1184747075"/>
+      </p:ext>
+    </p:extLst>
+  </p:cSld>
+  <p:clrMapOvr>
+    <a:masterClrMapping/>
+  </p:clrMapOvr>
+</p:sld>
+</file>
+
+<file path=ppt/slides/slide6.xml><?xml version="1.0" encoding="utf-8"?>
 <p:sld xmlns:a="http://schemas.openxmlformats.org/drawingml/2006/main" xmlns:r="http://schemas.openxmlformats.org/officeDocument/2006/relationships" xmlns:p="http://schemas.openxmlformats.org/presentationml/2006/main">
   <p:cSld>
     <p:spTree>
@@ -4558,557 +5346,6 @@
 </p:sld>
 </file>
 
-<file path=ppt/slides/slide2.xml><?xml version="1.0" encoding="utf-8"?>
-<p:sld xmlns:a="http://schemas.openxmlformats.org/drawingml/2006/main" xmlns:r="http://schemas.openxmlformats.org/officeDocument/2006/relationships" xmlns:p="http://schemas.openxmlformats.org/presentationml/2006/main">
-  <p:cSld>
-    <p:spTree>
-      <p:nvGrpSpPr>
-        <p:cNvPr id="1" name=""/>
-        <p:cNvGrpSpPr/>
-        <p:nvPr/>
-      </p:nvGrpSpPr>
-      <p:grpSpPr>
-        <a:xfrm>
-          <a:off x="0" y="0"/>
-          <a:ext cx="0" cy="0"/>
-          <a:chOff x="0" y="0"/>
-          <a:chExt cx="0" cy="0"/>
-        </a:xfrm>
-      </p:grpSpPr>
-      <p:sp>
-        <p:nvSpPr>
-          <p:cNvPr id="2" name="Titolo 1"/>
-          <p:cNvSpPr>
-            <a:spLocks noGrp="1"/>
-          </p:cNvSpPr>
-          <p:nvPr>
-            <p:ph type="ctrTitle"/>
-          </p:nvPr>
-        </p:nvSpPr>
-        <p:spPr>
-          <a:xfrm>
-            <a:off x="1524000" y="-898461"/>
-            <a:ext cx="9144000" cy="2387600"/>
-          </a:xfrm>
-        </p:spPr>
-        <p:txBody>
-          <a:bodyPr/>
-          <a:lstStyle/>
-          <a:p>
-            <a:r>
-              <a:rPr lang="en-US" dirty="0"/>
-              <a:t>General Architecture</a:t>
-            </a:r>
-          </a:p>
-        </p:txBody>
-      </p:sp>
-      <p:sp>
-        <p:nvSpPr>
-          <p:cNvPr id="3" name="Sottotitolo 2"/>
-          <p:cNvSpPr>
-            <a:spLocks noGrp="1"/>
-          </p:cNvSpPr>
-          <p:nvPr>
-            <p:ph type="subTitle" idx="1"/>
-          </p:nvPr>
-        </p:nvSpPr>
-        <p:spPr>
-          <a:xfrm>
-            <a:off x="1524000" y="1681798"/>
-            <a:ext cx="9144000" cy="1655762"/>
-          </a:xfrm>
-        </p:spPr>
-        <p:txBody>
-          <a:bodyPr>
-            <a:noAutofit/>
-          </a:bodyPr>
-          <a:lstStyle/>
-          <a:p>
-            <a:pPr marL="342900" indent="-342900" algn="l">
-              <a:buFont typeface="Arial" panose="020B0604020202020204" pitchFamily="34" charset="0"/>
-              <a:buChar char="•"/>
-            </a:pPr>
-            <a:r>
-              <a:rPr lang="en-US" sz="3600" b="1" dirty="0"/>
-              <a:t>Three Tier architecture </a:t>
-            </a:r>
-            <a:r>
-              <a:rPr lang="en-US" sz="3600" dirty="0"/>
-              <a:t>with distributed logic</a:t>
-            </a:r>
-          </a:p>
-          <a:p>
-            <a:pPr marL="342900" indent="-342900" algn="l">
-              <a:buFont typeface="Arial" panose="020B0604020202020204" pitchFamily="34" charset="0"/>
-              <a:buChar char="•"/>
-            </a:pPr>
-            <a:r>
-              <a:rPr lang="en-US" sz="3600" b="1" dirty="0"/>
-              <a:t>Client-server </a:t>
-            </a:r>
-            <a:r>
-              <a:rPr lang="en-US" sz="3600" dirty="0"/>
-              <a:t>for the interaction between the web application and the central system</a:t>
-            </a:r>
-          </a:p>
-          <a:p>
-            <a:pPr marL="342900" indent="-342900" algn="l">
-              <a:buFont typeface="Arial" panose="020B0604020202020204" pitchFamily="34" charset="0"/>
-              <a:buChar char="•"/>
-            </a:pPr>
-            <a:r>
-              <a:rPr lang="en-US" sz="3600" b="1" dirty="0"/>
-              <a:t>Event based </a:t>
-            </a:r>
-            <a:r>
-              <a:rPr lang="en-US" sz="3600" dirty="0"/>
-              <a:t>paradigm for the interaction between the vehicles and the central system</a:t>
-            </a:r>
-          </a:p>
-          <a:p>
-            <a:pPr marL="342900" indent="-342900" algn="l">
-              <a:buFont typeface="Arial" panose="020B0604020202020204" pitchFamily="34" charset="0"/>
-              <a:buChar char="•"/>
-            </a:pPr>
-            <a:r>
-              <a:rPr lang="en-US" sz="3600" b="1" dirty="0"/>
-              <a:t>JEE </a:t>
-            </a:r>
-            <a:r>
-              <a:rPr lang="en-US" sz="3600" dirty="0"/>
-              <a:t>to develop our system</a:t>
-            </a:r>
-            <a:endParaRPr lang="en-US" sz="3600" b="1" dirty="0"/>
-          </a:p>
-        </p:txBody>
-      </p:sp>
-    </p:spTree>
-    <p:extLst>
-      <p:ext uri="{BB962C8B-B14F-4D97-AF65-F5344CB8AC3E}">
-        <p14:creationId xmlns:p14="http://schemas.microsoft.com/office/powerpoint/2010/main" val="200315810"/>
-      </p:ext>
-    </p:extLst>
-  </p:cSld>
-  <p:clrMapOvr>
-    <a:masterClrMapping/>
-  </p:clrMapOvr>
-</p:sld>
-</file>
-
-<file path=ppt/slides/slide3.xml><?xml version="1.0" encoding="utf-8"?>
-<p:sld xmlns:a="http://schemas.openxmlformats.org/drawingml/2006/main" xmlns:r="http://schemas.openxmlformats.org/officeDocument/2006/relationships" xmlns:p="http://schemas.openxmlformats.org/presentationml/2006/main">
-  <p:cSld>
-    <p:spTree>
-      <p:nvGrpSpPr>
-        <p:cNvPr id="1" name=""/>
-        <p:cNvGrpSpPr/>
-        <p:nvPr/>
-      </p:nvGrpSpPr>
-      <p:grpSpPr>
-        <a:xfrm>
-          <a:off x="0" y="0"/>
-          <a:ext cx="0" cy="0"/>
-          <a:chOff x="0" y="0"/>
-          <a:chExt cx="0" cy="0"/>
-        </a:xfrm>
-      </p:grpSpPr>
-      <p:sp>
-        <p:nvSpPr>
-          <p:cNvPr id="2" name="Titolo 1"/>
-          <p:cNvSpPr>
-            <a:spLocks noGrp="1"/>
-          </p:cNvSpPr>
-          <p:nvPr>
-            <p:ph type="ctrTitle"/>
-          </p:nvPr>
-        </p:nvSpPr>
-        <p:spPr>
-          <a:xfrm>
-            <a:off x="1524000" y="-898461"/>
-            <a:ext cx="9144000" cy="2387600"/>
-          </a:xfrm>
-        </p:spPr>
-        <p:txBody>
-          <a:bodyPr/>
-          <a:lstStyle/>
-          <a:p>
-            <a:r>
-              <a:rPr lang="en-US" dirty="0"/>
-              <a:t>Advantages of using JEE</a:t>
-            </a:r>
-          </a:p>
-        </p:txBody>
-      </p:sp>
-      <p:sp>
-        <p:nvSpPr>
-          <p:cNvPr id="3" name="Sottotitolo 2"/>
-          <p:cNvSpPr>
-            <a:spLocks noGrp="1"/>
-          </p:cNvSpPr>
-          <p:nvPr>
-            <p:ph type="subTitle" idx="1"/>
-          </p:nvPr>
-        </p:nvSpPr>
-        <p:spPr>
-          <a:xfrm>
-            <a:off x="1524000" y="1681798"/>
-            <a:ext cx="9144000" cy="1655762"/>
-          </a:xfrm>
-        </p:spPr>
-        <p:txBody>
-          <a:bodyPr>
-            <a:noAutofit/>
-          </a:bodyPr>
-          <a:lstStyle/>
-          <a:p>
-            <a:pPr marL="342900" indent="-342900" algn="l">
-              <a:buFont typeface="Arial" panose="020B0604020202020204" pitchFamily="34" charset="0"/>
-              <a:buChar char="•"/>
-            </a:pPr>
-            <a:r>
-              <a:rPr lang="en-US" sz="3600" dirty="0"/>
-              <a:t>Develop a reliable system in a faster time using consolidated practices</a:t>
-            </a:r>
-          </a:p>
-          <a:p>
-            <a:pPr marL="342900" indent="-342900" algn="l">
-              <a:buFont typeface="Arial" panose="020B0604020202020204" pitchFamily="34" charset="0"/>
-              <a:buChar char="•"/>
-            </a:pPr>
-            <a:r>
-              <a:rPr lang="en-US" sz="3600" dirty="0"/>
-              <a:t>Reflect the component-based style of our architecture using Java Beans</a:t>
-            </a:r>
-          </a:p>
-          <a:p>
-            <a:pPr marL="342900" indent="-342900" algn="l">
-              <a:buFont typeface="Arial" panose="020B0604020202020204" pitchFamily="34" charset="0"/>
-              <a:buChar char="•"/>
-            </a:pPr>
-            <a:r>
-              <a:rPr lang="en-US" sz="3600" b="1" dirty="0"/>
-              <a:t>JPA </a:t>
-            </a:r>
-            <a:r>
-              <a:rPr lang="en-US" sz="3600" dirty="0"/>
-              <a:t>(Java </a:t>
-            </a:r>
-            <a:r>
-              <a:rPr lang="en-US" sz="3600" dirty="0" err="1"/>
-              <a:t>Persistance</a:t>
-            </a:r>
-            <a:r>
-              <a:rPr lang="en-US" sz="3600" dirty="0"/>
-              <a:t> API) to manage the persistence in our system</a:t>
-            </a:r>
-            <a:endParaRPr lang="en-US" sz="3600" b="1" dirty="0"/>
-          </a:p>
-          <a:p>
-            <a:pPr marL="342900" indent="-342900" algn="l">
-              <a:buFont typeface="Arial" panose="020B0604020202020204" pitchFamily="34" charset="0"/>
-              <a:buChar char="•"/>
-            </a:pPr>
-            <a:endParaRPr lang="en-US" sz="3600" dirty="0"/>
-          </a:p>
-        </p:txBody>
-      </p:sp>
-    </p:spTree>
-    <p:extLst>
-      <p:ext uri="{BB962C8B-B14F-4D97-AF65-F5344CB8AC3E}">
-        <p14:creationId xmlns:p14="http://schemas.microsoft.com/office/powerpoint/2010/main" val="1860341607"/>
-      </p:ext>
-    </p:extLst>
-  </p:cSld>
-  <p:clrMapOvr>
-    <a:masterClrMapping/>
-  </p:clrMapOvr>
-</p:sld>
-</file>
-
-<file path=ppt/slides/slide4.xml><?xml version="1.0" encoding="utf-8"?>
-<p:sld xmlns:a="http://schemas.openxmlformats.org/drawingml/2006/main" xmlns:r="http://schemas.openxmlformats.org/officeDocument/2006/relationships" xmlns:p="http://schemas.openxmlformats.org/presentationml/2006/main">
-  <p:cSld>
-    <p:spTree>
-      <p:nvGrpSpPr>
-        <p:cNvPr id="1" name=""/>
-        <p:cNvGrpSpPr/>
-        <p:nvPr/>
-      </p:nvGrpSpPr>
-      <p:grpSpPr>
-        <a:xfrm>
-          <a:off x="0" y="0"/>
-          <a:ext cx="0" cy="0"/>
-          <a:chOff x="0" y="0"/>
-          <a:chExt cx="0" cy="0"/>
-        </a:xfrm>
-      </p:grpSpPr>
-      <p:sp>
-        <p:nvSpPr>
-          <p:cNvPr id="2" name="Titolo 1"/>
-          <p:cNvSpPr>
-            <a:spLocks noGrp="1"/>
-          </p:cNvSpPr>
-          <p:nvPr>
-            <p:ph type="ctrTitle"/>
-          </p:nvPr>
-        </p:nvSpPr>
-        <p:spPr>
-          <a:xfrm>
-            <a:off x="1524000" y="-898461"/>
-            <a:ext cx="9144000" cy="2387600"/>
-          </a:xfrm>
-        </p:spPr>
-        <p:txBody>
-          <a:bodyPr/>
-          <a:lstStyle/>
-          <a:p>
-            <a:r>
-              <a:rPr lang="en-US" dirty="0"/>
-              <a:t>Google Maps API</a:t>
-            </a:r>
-          </a:p>
-        </p:txBody>
-      </p:sp>
-      <p:sp>
-        <p:nvSpPr>
-          <p:cNvPr id="3" name="Sottotitolo 2"/>
-          <p:cNvSpPr>
-            <a:spLocks noGrp="1"/>
-          </p:cNvSpPr>
-          <p:nvPr>
-            <p:ph type="subTitle" idx="1"/>
-          </p:nvPr>
-        </p:nvSpPr>
-        <p:spPr>
-          <a:xfrm>
-            <a:off x="1524000" y="1681798"/>
-            <a:ext cx="9144000" cy="1655762"/>
-          </a:xfrm>
-        </p:spPr>
-        <p:txBody>
-          <a:bodyPr>
-            <a:noAutofit/>
-          </a:bodyPr>
-          <a:lstStyle/>
-          <a:p>
-            <a:pPr marL="342900" indent="-342900" algn="l">
-              <a:buFont typeface="Arial" panose="020B0604020202020204" pitchFamily="34" charset="0"/>
-              <a:buChar char="•"/>
-            </a:pPr>
-            <a:r>
-              <a:rPr lang="en-US" sz="3600" dirty="0"/>
-              <a:t>It interacts directly with the application to display useful maps used by the user to access </a:t>
-            </a:r>
-            <a:r>
-              <a:rPr lang="en-US" sz="3600" dirty="0" err="1"/>
-              <a:t>PowerEnJoy</a:t>
-            </a:r>
-            <a:r>
-              <a:rPr lang="en-US" sz="3600" dirty="0"/>
-              <a:t> services</a:t>
-            </a:r>
-          </a:p>
-        </p:txBody>
-      </p:sp>
-    </p:spTree>
-    <p:extLst>
-      <p:ext uri="{BB962C8B-B14F-4D97-AF65-F5344CB8AC3E}">
-        <p14:creationId xmlns:p14="http://schemas.microsoft.com/office/powerpoint/2010/main" val="1965940064"/>
-      </p:ext>
-    </p:extLst>
-  </p:cSld>
-  <p:clrMapOvr>
-    <a:masterClrMapping/>
-  </p:clrMapOvr>
-</p:sld>
-</file>
-
-<file path=ppt/slides/slide5.xml><?xml version="1.0" encoding="utf-8"?>
-<p:sld xmlns:a="http://schemas.openxmlformats.org/drawingml/2006/main" xmlns:r="http://schemas.openxmlformats.org/officeDocument/2006/relationships" xmlns:p="http://schemas.openxmlformats.org/presentationml/2006/main">
-  <p:cSld>
-    <p:spTree>
-      <p:nvGrpSpPr>
-        <p:cNvPr id="1" name=""/>
-        <p:cNvGrpSpPr/>
-        <p:nvPr/>
-      </p:nvGrpSpPr>
-      <p:grpSpPr>
-        <a:xfrm>
-          <a:off x="0" y="0"/>
-          <a:ext cx="0" cy="0"/>
-          <a:chOff x="0" y="0"/>
-          <a:chExt cx="0" cy="0"/>
-        </a:xfrm>
-      </p:grpSpPr>
-      <p:sp>
-        <p:nvSpPr>
-          <p:cNvPr id="2" name="Titolo 1"/>
-          <p:cNvSpPr>
-            <a:spLocks noGrp="1"/>
-          </p:cNvSpPr>
-          <p:nvPr>
-            <p:ph type="title"/>
-          </p:nvPr>
-        </p:nvSpPr>
-        <p:spPr/>
-        <p:txBody>
-          <a:bodyPr/>
-          <a:lstStyle/>
-          <a:p>
-            <a:pPr algn="ctr"/>
-            <a:r>
-              <a:rPr lang="en-US" dirty="0"/>
-              <a:t>Component Based</a:t>
-            </a:r>
-          </a:p>
-        </p:txBody>
-      </p:sp>
-      <p:sp>
-        <p:nvSpPr>
-          <p:cNvPr id="3" name="Segnaposto contenuto 2"/>
-          <p:cNvSpPr>
-            <a:spLocks noGrp="1"/>
-          </p:cNvSpPr>
-          <p:nvPr>
-            <p:ph idx="1"/>
-          </p:nvPr>
-        </p:nvSpPr>
-        <p:spPr/>
-        <p:txBody>
-          <a:bodyPr/>
-          <a:lstStyle/>
-          <a:p>
-            <a:r>
-              <a:rPr lang="en-US" b="1" dirty="0"/>
-              <a:t>Component-based </a:t>
-            </a:r>
-            <a:r>
-              <a:rPr lang="en-US" dirty="0"/>
-              <a:t>advantages</a:t>
-            </a:r>
-            <a:r>
-              <a:rPr lang="en-US" b="1" dirty="0"/>
-              <a:t> : </a:t>
-            </a:r>
-            <a:endParaRPr lang="en-US" dirty="0"/>
-          </a:p>
-          <a:p>
-            <a:pPr lvl="1"/>
-            <a:r>
-              <a:rPr lang="en-US" dirty="0"/>
-              <a:t>Divide workloads </a:t>
-            </a:r>
-          </a:p>
-          <a:p>
-            <a:pPr lvl="1"/>
-            <a:r>
-              <a:rPr lang="en-US" dirty="0"/>
-              <a:t>Easily scalable</a:t>
-            </a:r>
-          </a:p>
-          <a:p>
-            <a:pPr marL="457200" lvl="1" indent="0">
-              <a:buNone/>
-            </a:pPr>
-            <a:endParaRPr lang="en-US" dirty="0"/>
-          </a:p>
-        </p:txBody>
-      </p:sp>
-      <p:sp>
-        <p:nvSpPr>
-          <p:cNvPr id="4" name="CasellaDiTesto 3"/>
-          <p:cNvSpPr txBox="1"/>
-          <p:nvPr/>
-        </p:nvSpPr>
-        <p:spPr>
-          <a:xfrm>
-            <a:off x="847344" y="3300984"/>
-            <a:ext cx="7168896" cy="523220"/>
-          </a:xfrm>
-          <a:prstGeom prst="rect">
-            <a:avLst/>
-          </a:prstGeom>
-          <a:noFill/>
-        </p:spPr>
-        <p:txBody>
-          <a:bodyPr wrap="square" rtlCol="0">
-            <a:spAutoFit/>
-          </a:bodyPr>
-          <a:lstStyle/>
-          <a:p>
-            <a:pPr marL="285750" indent="-285750">
-              <a:buFont typeface="Arial" panose="020B0604020202020204" pitchFamily="34" charset="0"/>
-              <a:buChar char="•"/>
-            </a:pPr>
-            <a:endParaRPr lang="en-US" sz="2800" b="1" dirty="0"/>
-          </a:p>
-        </p:txBody>
-      </p:sp>
-    </p:spTree>
-    <p:extLst>
-      <p:ext uri="{BB962C8B-B14F-4D97-AF65-F5344CB8AC3E}">
-        <p14:creationId xmlns:p14="http://schemas.microsoft.com/office/powerpoint/2010/main" val="3520994693"/>
-      </p:ext>
-    </p:extLst>
-  </p:cSld>
-  <p:clrMapOvr>
-    <a:masterClrMapping/>
-  </p:clrMapOvr>
-</p:sld>
-</file>
-
-<file path=ppt/slides/slide6.xml><?xml version="1.0" encoding="utf-8"?>
-<p:sld xmlns:a="http://schemas.openxmlformats.org/drawingml/2006/main" xmlns:r="http://schemas.openxmlformats.org/officeDocument/2006/relationships" xmlns:p="http://schemas.openxmlformats.org/presentationml/2006/main">
-  <p:cSld>
-    <p:spTree>
-      <p:nvGrpSpPr>
-        <p:cNvPr id="1" name=""/>
-        <p:cNvGrpSpPr/>
-        <p:nvPr/>
-      </p:nvGrpSpPr>
-      <p:grpSpPr>
-        <a:xfrm>
-          <a:off x="0" y="0"/>
-          <a:ext cx="0" cy="0"/>
-          <a:chOff x="0" y="0"/>
-          <a:chExt cx="0" cy="0"/>
-        </a:xfrm>
-      </p:grpSpPr>
-      <p:sp>
-        <p:nvSpPr>
-          <p:cNvPr id="2" name="Titolo 1"/>
-          <p:cNvSpPr>
-            <a:spLocks noGrp="1"/>
-          </p:cNvSpPr>
-          <p:nvPr>
-            <p:ph type="ctrTitle"/>
-          </p:nvPr>
-        </p:nvSpPr>
-        <p:spPr/>
-        <p:txBody>
-          <a:bodyPr/>
-          <a:lstStyle/>
-          <a:p>
-            <a:r>
-              <a:rPr lang="it-IT" dirty="0"/>
-              <a:t>OVERVIEW</a:t>
-            </a:r>
-          </a:p>
-        </p:txBody>
-      </p:sp>
-    </p:spTree>
-    <p:extLst>
-      <p:ext uri="{BB962C8B-B14F-4D97-AF65-F5344CB8AC3E}">
-        <p14:creationId xmlns:p14="http://schemas.microsoft.com/office/powerpoint/2010/main" val="1641834448"/>
-      </p:ext>
-    </p:extLst>
-  </p:cSld>
-  <p:clrMapOvr>
-    <a:masterClrMapping/>
-  </p:clrMapOvr>
-</p:sld>
-</file>
-
 <file path=ppt/slides/slide7.xml><?xml version="1.0" encoding="utf-8"?>
 <p:sld xmlns:a="http://schemas.openxmlformats.org/drawingml/2006/main" xmlns:r="http://schemas.openxmlformats.org/officeDocument/2006/relationships" xmlns:p="http://schemas.openxmlformats.org/presentationml/2006/main">
   <p:cSld>
@@ -5126,270 +5363,117 @@
           <a:chExt cx="0" cy="0"/>
         </a:xfrm>
       </p:grpSpPr>
-      <p:pic>
-        <p:nvPicPr>
-          <p:cNvPr id="9" name="Immagine 8"/>
-          <p:cNvPicPr>
-            <a:picLocks noChangeAspect="1"/>
-          </p:cNvPicPr>
-          <p:nvPr/>
-        </p:nvPicPr>
-        <p:blipFill>
-          <a:blip r:embed="rId2">
-            <a:extLst>
-              <a:ext uri="{28A0092B-C50C-407E-A947-70E740481C1C}">
-                <a14:useLocalDpi xmlns:a14="http://schemas.microsoft.com/office/drawing/2010/main" val="0"/>
-              </a:ext>
-            </a:extLst>
-          </a:blip>
-          <a:stretch>
-            <a:fillRect/>
-          </a:stretch>
-        </p:blipFill>
+      <p:sp>
+        <p:nvSpPr>
+          <p:cNvPr id="2" name="Titolo 1"/>
+          <p:cNvSpPr>
+            <a:spLocks noGrp="1"/>
+          </p:cNvSpPr>
+          <p:nvPr>
+            <p:ph type="ctrTitle"/>
+          </p:nvPr>
+        </p:nvSpPr>
         <p:spPr>
           <a:xfrm>
-            <a:off x="348615" y="569008"/>
-            <a:ext cx="8668775" cy="5879893"/>
+            <a:off x="1524000" y="-898461"/>
+            <a:ext cx="9144000" cy="2387600"/>
           </a:xfrm>
-          <a:prstGeom prst="rect">
-            <a:avLst/>
-          </a:prstGeom>
         </p:spPr>
-      </p:pic>
-      <p:sp>
-        <p:nvSpPr>
-          <p:cNvPr id="10" name="CasellaDiTesto 9"/>
-          <p:cNvSpPr txBox="1"/>
-          <p:nvPr/>
+        <p:txBody>
+          <a:bodyPr/>
+          <a:lstStyle/>
+          <a:p>
+            <a:r>
+              <a:rPr lang="en-US" dirty="0"/>
+              <a:t>General Architecture</a:t>
+            </a:r>
+          </a:p>
+        </p:txBody>
+      </p:sp>
+      <p:sp>
+        <p:nvSpPr>
+          <p:cNvPr id="3" name="Sottotitolo 2"/>
+          <p:cNvSpPr>
+            <a:spLocks noGrp="1"/>
+          </p:cNvSpPr>
+          <p:nvPr>
+            <p:ph type="subTitle" idx="1"/>
+          </p:nvPr>
         </p:nvSpPr>
         <p:spPr>
           <a:xfrm>
-            <a:off x="9214338" y="534572"/>
-            <a:ext cx="2799471" cy="2554545"/>
+            <a:off x="1524000" y="1681798"/>
+            <a:ext cx="9144000" cy="1655762"/>
           </a:xfrm>
-          <a:prstGeom prst="rect">
-            <a:avLst/>
-          </a:prstGeom>
-          <a:noFill/>
         </p:spPr>
         <p:txBody>
-          <a:bodyPr wrap="square" rtlCol="0">
-            <a:spAutoFit/>
+          <a:bodyPr>
+            <a:noAutofit/>
           </a:bodyPr>
           <a:lstStyle/>
           <a:p>
-            <a:pPr marL="0" marR="0" lvl="0" indent="0" defTabSz="914400" eaLnBrk="1" fontAlgn="auto" latinLnBrk="0" hangingPunct="1">
-              <a:lnSpc>
-                <a:spcPct val="100000"/>
-              </a:lnSpc>
-              <a:spcBef>
-                <a:spcPts val="0"/>
-              </a:spcBef>
-              <a:spcAft>
-                <a:spcPts val="0"/>
-              </a:spcAft>
-              <a:buClrTx/>
-              <a:buSzTx/>
-              <a:buFontTx/>
-              <a:buNone/>
-              <a:tabLst/>
-              <a:defRPr/>
+            <a:pPr marL="342900" indent="-342900" algn="l">
+              <a:buFont typeface="Arial" panose="020B0604020202020204" pitchFamily="34" charset="0"/>
+              <a:buChar char="•"/>
             </a:pPr>
             <a:r>
-              <a:rPr kumimoji="0" lang="it-IT" sz="3200" b="0" i="0" u="none" strike="noStrike" kern="0" cap="none" spc="0" normalizeH="0" baseline="0" noProof="0" dirty="0">
-                <a:ln>
-                  <a:noFill/>
-                </a:ln>
-                <a:solidFill>
-                  <a:sysClr val="windowText" lastClr="000000"/>
-                </a:solidFill>
-                <a:effectLst/>
-                <a:uLnTx/>
-                <a:uFillTx/>
-              </a:rPr>
-              <a:t>LEGEND:</a:t>
-            </a:r>
-          </a:p>
-          <a:p>
-            <a:pPr marL="285750" marR="0" lvl="0" indent="-285750" defTabSz="914400" eaLnBrk="1" fontAlgn="auto" latinLnBrk="0" hangingPunct="1">
-              <a:lnSpc>
-                <a:spcPct val="100000"/>
-              </a:lnSpc>
-              <a:spcBef>
-                <a:spcPts val="0"/>
-              </a:spcBef>
-              <a:spcAft>
-                <a:spcPts val="0"/>
-              </a:spcAft>
-              <a:buClrTx/>
-              <a:buSzTx/>
-              <a:buFontTx/>
-              <a:buChar char="-"/>
-              <a:tabLst/>
-              <a:defRPr/>
+              <a:rPr lang="en-US" sz="3600" b="1" dirty="0"/>
+              <a:t>Three Tier architecture </a:t>
+            </a:r>
+            <a:r>
+              <a:rPr lang="en-US" sz="3600" dirty="0"/>
+              <a:t>with distributed logic</a:t>
+            </a:r>
+          </a:p>
+          <a:p>
+            <a:pPr marL="342900" indent="-342900" algn="l">
+              <a:buFont typeface="Arial" panose="020B0604020202020204" pitchFamily="34" charset="0"/>
+              <a:buChar char="•"/>
             </a:pPr>
             <a:r>
-              <a:rPr kumimoji="0" lang="it-IT" sz="3200" b="0" i="0" u="none" strike="noStrike" kern="0" cap="none" spc="0" normalizeH="0" baseline="0" noProof="0" dirty="0">
-                <a:ln>
-                  <a:noFill/>
-                </a:ln>
-                <a:solidFill>
-                  <a:srgbClr val="FF0000"/>
-                </a:solidFill>
-                <a:effectLst/>
-                <a:uLnTx/>
-                <a:uFillTx/>
-              </a:rPr>
-              <a:t>Presentation </a:t>
-            </a:r>
-            <a:r>
-              <a:rPr kumimoji="0" lang="it-IT" sz="3200" b="0" i="0" u="none" strike="noStrike" kern="0" cap="none" spc="0" normalizeH="0" baseline="0" noProof="0" dirty="0" err="1">
-                <a:ln>
-                  <a:noFill/>
-                </a:ln>
-                <a:solidFill>
-                  <a:srgbClr val="FF0000"/>
-                </a:solidFill>
-                <a:effectLst/>
-                <a:uLnTx/>
-                <a:uFillTx/>
-              </a:rPr>
-              <a:t>Tier</a:t>
-            </a:r>
-            <a:endParaRPr kumimoji="0" lang="it-IT" sz="3200" b="0" i="0" u="none" strike="noStrike" kern="0" cap="none" spc="0" normalizeH="0" baseline="0" noProof="0" dirty="0">
-              <a:ln>
-                <a:noFill/>
-              </a:ln>
-              <a:solidFill>
-                <a:srgbClr val="FF0000"/>
-              </a:solidFill>
-              <a:effectLst/>
-              <a:uLnTx/>
-              <a:uFillTx/>
-            </a:endParaRPr>
-          </a:p>
-          <a:p>
-            <a:pPr marL="285750" marR="0" lvl="0" indent="-285750" defTabSz="914400" eaLnBrk="1" fontAlgn="auto" latinLnBrk="0" hangingPunct="1">
-              <a:lnSpc>
-                <a:spcPct val="100000"/>
-              </a:lnSpc>
-              <a:spcBef>
-                <a:spcPts val="0"/>
-              </a:spcBef>
-              <a:spcAft>
-                <a:spcPts val="0"/>
-              </a:spcAft>
-              <a:buClrTx/>
-              <a:buSzTx/>
-              <a:buFontTx/>
-              <a:buChar char="-"/>
-              <a:tabLst/>
-              <a:defRPr/>
+              <a:rPr lang="en-US" sz="3600" b="1" dirty="0"/>
+              <a:t>Client-server </a:t>
+            </a:r>
+            <a:r>
+              <a:rPr lang="en-US" sz="3600" dirty="0"/>
+              <a:t>for the interaction between the web application and the central system</a:t>
+            </a:r>
+          </a:p>
+          <a:p>
+            <a:pPr marL="342900" indent="-342900" algn="l">
+              <a:buFont typeface="Arial" panose="020B0604020202020204" pitchFamily="34" charset="0"/>
+              <a:buChar char="•"/>
             </a:pPr>
             <a:r>
-              <a:rPr kumimoji="0" lang="it-IT" sz="3200" b="0" i="0" u="none" strike="noStrike" kern="0" cap="none" spc="0" normalizeH="0" baseline="0" noProof="0" dirty="0">
-                <a:ln>
-                  <a:noFill/>
-                </a:ln>
-                <a:solidFill>
-                  <a:srgbClr val="00B050"/>
-                </a:solidFill>
-                <a:effectLst/>
-                <a:uLnTx/>
-                <a:uFillTx/>
-              </a:rPr>
-              <a:t>Business </a:t>
-            </a:r>
-            <a:r>
-              <a:rPr kumimoji="0" lang="it-IT" sz="3200" b="0" i="0" u="none" strike="noStrike" kern="0" cap="none" spc="0" normalizeH="0" baseline="0" noProof="0" dirty="0" err="1">
-                <a:ln>
-                  <a:noFill/>
-                </a:ln>
-                <a:solidFill>
-                  <a:srgbClr val="00B050"/>
-                </a:solidFill>
-                <a:effectLst/>
-                <a:uLnTx/>
-                <a:uFillTx/>
-              </a:rPr>
-              <a:t>Tier</a:t>
-            </a:r>
-            <a:endParaRPr kumimoji="0" lang="it-IT" sz="3200" b="0" i="0" u="none" strike="noStrike" kern="0" cap="none" spc="0" normalizeH="0" baseline="0" noProof="0" dirty="0">
-              <a:ln>
-                <a:noFill/>
-              </a:ln>
-              <a:solidFill>
-                <a:srgbClr val="00B050"/>
-              </a:solidFill>
-              <a:effectLst/>
-              <a:uLnTx/>
-              <a:uFillTx/>
-            </a:endParaRPr>
-          </a:p>
-          <a:p>
-            <a:pPr marL="285750" marR="0" lvl="0" indent="-285750" defTabSz="914400" eaLnBrk="1" fontAlgn="auto" latinLnBrk="0" hangingPunct="1">
-              <a:lnSpc>
-                <a:spcPct val="100000"/>
-              </a:lnSpc>
-              <a:spcBef>
-                <a:spcPts val="0"/>
-              </a:spcBef>
-              <a:spcAft>
-                <a:spcPts val="0"/>
-              </a:spcAft>
-              <a:buClrTx/>
-              <a:buSzTx/>
-              <a:buFontTx/>
-              <a:buChar char="-"/>
-              <a:tabLst/>
-              <a:defRPr/>
+              <a:rPr lang="en-US" sz="3600" b="1" dirty="0"/>
+              <a:t>Event based </a:t>
+            </a:r>
+            <a:r>
+              <a:rPr lang="en-US" sz="3600" dirty="0"/>
+              <a:t>paradigm for the interaction between the vehicles and the central system</a:t>
+            </a:r>
+          </a:p>
+          <a:p>
+            <a:pPr marL="342900" indent="-342900" algn="l">
+              <a:buFont typeface="Arial" panose="020B0604020202020204" pitchFamily="34" charset="0"/>
+              <a:buChar char="•"/>
             </a:pPr>
             <a:r>
-              <a:rPr kumimoji="0" lang="it-IT" sz="3200" b="0" i="0" u="none" strike="noStrike" kern="0" cap="none" spc="0" normalizeH="0" baseline="0" noProof="0" dirty="0">
-                <a:ln>
-                  <a:noFill/>
-                </a:ln>
-                <a:solidFill>
-                  <a:srgbClr val="0070C0"/>
-                </a:solidFill>
-                <a:effectLst/>
-                <a:uLnTx/>
-                <a:uFillTx/>
-              </a:rPr>
-              <a:t>Data </a:t>
-            </a:r>
-            <a:r>
-              <a:rPr kumimoji="0" lang="it-IT" sz="3200" b="0" i="0" u="none" strike="noStrike" kern="0" cap="none" spc="0" normalizeH="0" baseline="0" noProof="0" dirty="0" err="1">
-                <a:ln>
-                  <a:noFill/>
-                </a:ln>
-                <a:solidFill>
-                  <a:srgbClr val="0070C0"/>
-                </a:solidFill>
-                <a:effectLst/>
-                <a:uLnTx/>
-                <a:uFillTx/>
-              </a:rPr>
-              <a:t>Tier</a:t>
-            </a:r>
-            <a:endParaRPr kumimoji="0" lang="it-IT" sz="3200" b="0" i="0" u="none" strike="noStrike" kern="0" cap="none" spc="0" normalizeH="0" baseline="0" noProof="0" dirty="0">
-              <a:ln>
-                <a:noFill/>
-              </a:ln>
-              <a:solidFill>
-                <a:srgbClr val="0070C0"/>
-              </a:solidFill>
-              <a:effectLst/>
-              <a:uLnTx/>
-              <a:uFillTx/>
-            </a:endParaRPr>
+              <a:rPr lang="en-US" sz="3600" b="1" dirty="0"/>
+              <a:t>JEE </a:t>
+            </a:r>
+            <a:r>
+              <a:rPr lang="en-US" sz="3600" dirty="0"/>
+              <a:t>to develop our system</a:t>
+            </a:r>
+            <a:endParaRPr lang="en-US" sz="3600" b="1" dirty="0"/>
           </a:p>
         </p:txBody>
       </p:sp>
     </p:spTree>
     <p:extLst>
       <p:ext uri="{BB962C8B-B14F-4D97-AF65-F5344CB8AC3E}">
-        <p14:creationId xmlns:p14="http://schemas.microsoft.com/office/powerpoint/2010/main" val="3688357543"/>
+        <p14:creationId xmlns:p14="http://schemas.microsoft.com/office/powerpoint/2010/main" val="200315810"/>
       </p:ext>
     </p:extLst>
   </p:cSld>
@@ -5423,194 +5507,103 @@
             <a:spLocks noGrp="1"/>
           </p:cNvSpPr>
           <p:nvPr>
-            <p:ph type="title"/>
-          </p:nvPr>
-        </p:nvSpPr>
-        <p:spPr/>
-        <p:txBody>
-          <a:bodyPr/>
-          <a:lstStyle/>
-          <a:p>
-            <a:r>
-              <a:rPr lang="it-IT" dirty="0"/>
-              <a:t>Business </a:t>
-            </a:r>
-            <a:r>
-              <a:rPr lang="it-IT" dirty="0" err="1"/>
-              <a:t>Logic</a:t>
-            </a:r>
-            <a:r>
-              <a:rPr lang="it-IT" dirty="0"/>
-              <a:t> </a:t>
-            </a:r>
-            <a:r>
-              <a:rPr lang="it-IT" dirty="0" err="1"/>
-              <a:t>Partition</a:t>
-            </a:r>
-            <a:endParaRPr lang="it-IT" dirty="0"/>
-          </a:p>
-        </p:txBody>
-      </p:sp>
-      <p:sp>
-        <p:nvSpPr>
-          <p:cNvPr id="3" name="Segnaposto contenuto 2"/>
-          <p:cNvSpPr>
-            <a:spLocks noGrp="1"/>
-          </p:cNvSpPr>
-          <p:nvPr>
-            <p:ph idx="1"/>
-          </p:nvPr>
-        </p:nvSpPr>
-        <p:spPr/>
-        <p:txBody>
-          <a:bodyPr numCol="2" spcCol="1116000"/>
-          <a:lstStyle/>
-          <a:p>
-            <a:pPr marL="0" indent="0">
-              <a:buNone/>
+            <p:ph type="ctrTitle"/>
+          </p:nvPr>
+        </p:nvSpPr>
+        <p:spPr>
+          <a:xfrm>
+            <a:off x="1524000" y="-898461"/>
+            <a:ext cx="9144000" cy="2387600"/>
+          </a:xfrm>
+        </p:spPr>
+        <p:txBody>
+          <a:bodyPr/>
+          <a:lstStyle/>
+          <a:p>
+            <a:r>
+              <a:rPr lang="en-US" dirty="0"/>
+              <a:t>Advantages of using JEE</a:t>
+            </a:r>
+          </a:p>
+        </p:txBody>
+      </p:sp>
+      <p:sp>
+        <p:nvSpPr>
+          <p:cNvPr id="3" name="Sottotitolo 2"/>
+          <p:cNvSpPr>
+            <a:spLocks noGrp="1"/>
+          </p:cNvSpPr>
+          <p:nvPr>
+            <p:ph type="subTitle" idx="1"/>
+          </p:nvPr>
+        </p:nvSpPr>
+        <p:spPr>
+          <a:xfrm>
+            <a:off x="1524000" y="1681798"/>
+            <a:ext cx="9144000" cy="1655762"/>
+          </a:xfrm>
+        </p:spPr>
+        <p:txBody>
+          <a:bodyPr>
+            <a:noAutofit/>
+          </a:bodyPr>
+          <a:lstStyle/>
+          <a:p>
+            <a:pPr marL="342900" indent="-342900" algn="l">
+              <a:buFont typeface="Arial" panose="020B0604020202020204" pitchFamily="34" charset="0"/>
+              <a:buChar char="•"/>
             </a:pPr>
             <a:r>
-              <a:rPr lang="it-IT" sz="3200" b="1" dirty="0"/>
-              <a:t>API Server</a:t>
-            </a:r>
-          </a:p>
-          <a:p>
-            <a:pPr>
-              <a:buFontTx/>
-              <a:buChar char="-"/>
+              <a:rPr lang="en-US" sz="3600" dirty="0"/>
+              <a:t>Develop a reliable system in a faster time using consolidated practices</a:t>
+            </a:r>
+          </a:p>
+          <a:p>
+            <a:pPr marL="342900" indent="-342900" algn="l">
+              <a:buFont typeface="Arial" panose="020B0604020202020204" pitchFamily="34" charset="0"/>
+              <a:buChar char="•"/>
             </a:pPr>
             <a:r>
-              <a:rPr lang="it-IT" dirty="0"/>
-              <a:t>Account Management</a:t>
-            </a:r>
-          </a:p>
-          <a:p>
-            <a:pPr>
-              <a:buFontTx/>
-              <a:buChar char="-"/>
+              <a:rPr lang="en-US" sz="3600" dirty="0"/>
+              <a:t>Reflect the component-based style of our architecture using Java Beans</a:t>
+            </a:r>
+          </a:p>
+          <a:p>
+            <a:pPr marL="342900" indent="-342900" algn="l">
+              <a:buFont typeface="Arial" panose="020B0604020202020204" pitchFamily="34" charset="0"/>
+              <a:buChar char="•"/>
             </a:pPr>
             <a:r>
-              <a:rPr lang="it-IT" dirty="0" err="1"/>
-              <a:t>Reservation</a:t>
-            </a:r>
-            <a:r>
-              <a:rPr lang="it-IT" dirty="0"/>
-              <a:t> Management</a:t>
-            </a:r>
-          </a:p>
-          <a:p>
-            <a:pPr>
-              <a:buFontTx/>
-              <a:buChar char="-"/>
+              <a:rPr lang="en-US" sz="3600" b="1" dirty="0"/>
+              <a:t>JPA </a:t>
+            </a:r>
+            <a:r>
+              <a:rPr lang="en-US" sz="3600" dirty="0"/>
+              <a:t>(Java </a:t>
+            </a:r>
+            <a:r>
+              <a:rPr lang="en-US" sz="3600" dirty="0" err="1"/>
+              <a:t>Persistance</a:t>
+            </a:r>
+            <a:r>
+              <a:rPr lang="en-US" sz="3600" dirty="0"/>
+              <a:t> API) to manage the persistence in our system</a:t>
+            </a:r>
+            <a:endParaRPr lang="en-US" sz="3600" b="1" dirty="0"/>
+          </a:p>
+          <a:p>
+            <a:pPr marL="342900" indent="-342900" algn="l">
+              <a:buFont typeface="Arial" panose="020B0604020202020204" pitchFamily="34" charset="0"/>
+              <a:buChar char="•"/>
             </a:pPr>
-            <a:r>
-              <a:rPr lang="it-IT" dirty="0" err="1"/>
-              <a:t>Fleet</a:t>
-            </a:r>
-            <a:r>
-              <a:rPr lang="it-IT" dirty="0"/>
-              <a:t> Management</a:t>
-            </a:r>
-          </a:p>
-          <a:p>
-            <a:pPr>
-              <a:buFontTx/>
-              <a:buChar char="-"/>
-            </a:pPr>
-            <a:endParaRPr lang="it-IT" dirty="0"/>
-          </a:p>
-          <a:p>
-            <a:pPr>
-              <a:buFontTx/>
-              <a:buChar char="-"/>
-            </a:pPr>
-            <a:endParaRPr lang="it-IT" dirty="0"/>
-          </a:p>
-          <a:p>
-            <a:pPr>
-              <a:buFontTx/>
-              <a:buChar char="-"/>
-            </a:pPr>
-            <a:endParaRPr lang="it-IT" dirty="0"/>
-          </a:p>
-          <a:p>
-            <a:pPr>
-              <a:buFontTx/>
-              <a:buChar char="-"/>
-            </a:pPr>
-            <a:endParaRPr lang="it-IT" dirty="0"/>
-          </a:p>
-          <a:p>
-            <a:pPr marL="0" indent="0">
-              <a:buNone/>
-            </a:pPr>
-            <a:r>
-              <a:rPr lang="it-IT" sz="3200" b="1" dirty="0" err="1"/>
-              <a:t>CarApplication</a:t>
-            </a:r>
-            <a:endParaRPr lang="it-IT" sz="3200" b="1" dirty="0"/>
-          </a:p>
-          <a:p>
-            <a:pPr>
-              <a:buFontTx/>
-              <a:buChar char="-"/>
-            </a:pPr>
-            <a:r>
-              <a:rPr lang="it-IT" dirty="0"/>
-              <a:t>Data Collection and Analysis</a:t>
-            </a:r>
-          </a:p>
-          <a:p>
-            <a:pPr>
-              <a:buFontTx/>
-              <a:buChar char="-"/>
-            </a:pPr>
-            <a:r>
-              <a:rPr lang="it-IT" dirty="0"/>
-              <a:t>Ride </a:t>
-            </a:r>
-            <a:r>
-              <a:rPr lang="it-IT" dirty="0" err="1"/>
-              <a:t>Monitoring</a:t>
-            </a:r>
-            <a:endParaRPr lang="it-IT" dirty="0"/>
-          </a:p>
-          <a:p>
-            <a:pPr>
-              <a:buFontTx/>
-              <a:buChar char="-"/>
-            </a:pPr>
-            <a:r>
-              <a:rPr lang="it-IT" dirty="0" err="1"/>
-              <a:t>Rule</a:t>
-            </a:r>
-            <a:r>
-              <a:rPr lang="it-IT" dirty="0"/>
-              <a:t> </a:t>
-            </a:r>
-            <a:r>
-              <a:rPr lang="it-IT" dirty="0" err="1"/>
-              <a:t>Infraction</a:t>
-            </a:r>
-            <a:r>
-              <a:rPr lang="it-IT" dirty="0"/>
-              <a:t> </a:t>
-            </a:r>
-            <a:r>
-              <a:rPr lang="it-IT" dirty="0" err="1"/>
-              <a:t>Detection</a:t>
-            </a:r>
-            <a:r>
-              <a:rPr lang="it-IT" dirty="0"/>
-              <a:t> and Notification</a:t>
-            </a:r>
+            <a:endParaRPr lang="en-US" sz="3600" dirty="0"/>
           </a:p>
         </p:txBody>
       </p:sp>
     </p:spTree>
     <p:extLst>
       <p:ext uri="{BB962C8B-B14F-4D97-AF65-F5344CB8AC3E}">
-        <p14:creationId xmlns:p14="http://schemas.microsoft.com/office/powerpoint/2010/main" val="1444003728"/>
+        <p14:creationId xmlns:p14="http://schemas.microsoft.com/office/powerpoint/2010/main" val="1860341607"/>
       </p:ext>
     </p:extLst>
   </p:cSld>
@@ -5647,21 +5640,60 @@
             <p:ph type="ctrTitle"/>
           </p:nvPr>
         </p:nvSpPr>
-        <p:spPr/>
-        <p:txBody>
-          <a:bodyPr/>
-          <a:lstStyle/>
-          <a:p>
-            <a:r>
-              <a:rPr lang="it-IT" dirty="0"/>
-              <a:t>DEPLOYMENT</a:t>
-            </a:r>
-            <a:br>
-              <a:rPr lang="it-IT" dirty="0"/>
-            </a:br>
-            <a:r>
-              <a:rPr lang="it-IT" dirty="0"/>
-              <a:t>VIEW</a:t>
+        <p:spPr>
+          <a:xfrm>
+            <a:off x="1524000" y="-898461"/>
+            <a:ext cx="9144000" cy="2387600"/>
+          </a:xfrm>
+        </p:spPr>
+        <p:txBody>
+          <a:bodyPr/>
+          <a:lstStyle/>
+          <a:p>
+            <a:r>
+              <a:rPr lang="en-US" dirty="0"/>
+              <a:t>Google Maps API</a:t>
+            </a:r>
+          </a:p>
+        </p:txBody>
+      </p:sp>
+      <p:sp>
+        <p:nvSpPr>
+          <p:cNvPr id="3" name="Sottotitolo 2"/>
+          <p:cNvSpPr>
+            <a:spLocks noGrp="1"/>
+          </p:cNvSpPr>
+          <p:nvPr>
+            <p:ph type="subTitle" idx="1"/>
+          </p:nvPr>
+        </p:nvSpPr>
+        <p:spPr>
+          <a:xfrm>
+            <a:off x="1524000" y="1681798"/>
+            <a:ext cx="9144000" cy="1655762"/>
+          </a:xfrm>
+        </p:spPr>
+        <p:txBody>
+          <a:bodyPr>
+            <a:noAutofit/>
+          </a:bodyPr>
+          <a:lstStyle/>
+          <a:p>
+            <a:pPr marL="342900" indent="-342900" algn="l">
+              <a:buFont typeface="Arial" panose="020B0604020202020204" pitchFamily="34" charset="0"/>
+              <a:buChar char="•"/>
+            </a:pPr>
+            <a:r>
+              <a:rPr lang="en-US" sz="3600" dirty="0"/>
+              <a:t>It interacts directly with the application to display useful maps used by the user to access </a:t>
+            </a:r>
+            <a:r>
+              <a:rPr lang="en-US" sz="3600" dirty="0" err="1"/>
+              <a:t>PowerEnJoy</a:t>
+            </a:r>
+            <a:r>
+              <a:rPr lang="en-US" sz="3600" dirty="0"/>
+              <a:t> services</a:t>
             </a:r>
           </a:p>
         </p:txBody>
@@ -5669,7 +5701,7 @@
     </p:spTree>
     <p:extLst>
       <p:ext uri="{BB962C8B-B14F-4D97-AF65-F5344CB8AC3E}">
-        <p14:creationId xmlns:p14="http://schemas.microsoft.com/office/powerpoint/2010/main" val="1184747075"/>
+        <p14:creationId xmlns:p14="http://schemas.microsoft.com/office/powerpoint/2010/main" val="1965940064"/>
       </p:ext>
     </p:extLst>
   </p:cSld>

</xml_diff>